<commit_message>
A new update on the Slides, and one more picture
</commit_message>
<xml_diff>
--- a/doc/tex/sdf/tq_76558_cow_protocol/figures_raw/Bob.pptx
+++ b/doc/tex/sdf/tq_76558_cow_protocol/figures_raw/Bob.pptx
@@ -6,6 +6,7 @@
   </p:sldMasterIdLst>
   <p:sldIdLst>
     <p:sldId id="256" r:id="rId2"/>
+    <p:sldId id="257" r:id="rId3"/>
   </p:sldIdLst>
   <p:sldSz cx="12192000" cy="6858000"/>
   <p:notesSz cx="6858000" cy="9144000"/>
@@ -104,6 +105,11 @@
       </a:defRPr>
     </a:lvl9pPr>
   </p:defaultTextStyle>
+  <p:extLst>
+    <p:ext uri="{EFAFB233-063F-42B5-8137-9DF3F51BA10A}">
+      <p15:sldGuideLst xmlns:p15="http://schemas.microsoft.com/office/powerpoint/2012/main"/>
+    </p:ext>
+  </p:extLst>
 </p:presentation>
 </file>
 
@@ -256,7 +262,7 @@
           <a:p>
             <a:fld id="{4B3AA8C6-FF6F-4F8F-942E-89BFB6A8B502}" type="datetimeFigureOut">
               <a:rPr lang="en-GB" smtClean="0"/>
-              <a:t>03/10/2018</a:t>
+              <a:t>06/10/2018</a:t>
             </a:fld>
             <a:endParaRPr lang="en-GB"/>
           </a:p>
@@ -456,7 +462,7 @@
           <a:p>
             <a:fld id="{4B3AA8C6-FF6F-4F8F-942E-89BFB6A8B502}" type="datetimeFigureOut">
               <a:rPr lang="en-GB" smtClean="0"/>
-              <a:t>03/10/2018</a:t>
+              <a:t>06/10/2018</a:t>
             </a:fld>
             <a:endParaRPr lang="en-GB"/>
           </a:p>
@@ -666,7 +672,7 @@
           <a:p>
             <a:fld id="{4B3AA8C6-FF6F-4F8F-942E-89BFB6A8B502}" type="datetimeFigureOut">
               <a:rPr lang="en-GB" smtClean="0"/>
-              <a:t>03/10/2018</a:t>
+              <a:t>06/10/2018</a:t>
             </a:fld>
             <a:endParaRPr lang="en-GB"/>
           </a:p>
@@ -866,7 +872,7 @@
           <a:p>
             <a:fld id="{4B3AA8C6-FF6F-4F8F-942E-89BFB6A8B502}" type="datetimeFigureOut">
               <a:rPr lang="en-GB" smtClean="0"/>
-              <a:t>03/10/2018</a:t>
+              <a:t>06/10/2018</a:t>
             </a:fld>
             <a:endParaRPr lang="en-GB"/>
           </a:p>
@@ -1142,7 +1148,7 @@
           <a:p>
             <a:fld id="{4B3AA8C6-FF6F-4F8F-942E-89BFB6A8B502}" type="datetimeFigureOut">
               <a:rPr lang="en-GB" smtClean="0"/>
-              <a:t>03/10/2018</a:t>
+              <a:t>06/10/2018</a:t>
             </a:fld>
             <a:endParaRPr lang="en-GB"/>
           </a:p>
@@ -1410,7 +1416,7 @@
           <a:p>
             <a:fld id="{4B3AA8C6-FF6F-4F8F-942E-89BFB6A8B502}" type="datetimeFigureOut">
               <a:rPr lang="en-GB" smtClean="0"/>
-              <a:t>03/10/2018</a:t>
+              <a:t>06/10/2018</a:t>
             </a:fld>
             <a:endParaRPr lang="en-GB"/>
           </a:p>
@@ -1825,7 +1831,7 @@
           <a:p>
             <a:fld id="{4B3AA8C6-FF6F-4F8F-942E-89BFB6A8B502}" type="datetimeFigureOut">
               <a:rPr lang="en-GB" smtClean="0"/>
-              <a:t>03/10/2018</a:t>
+              <a:t>06/10/2018</a:t>
             </a:fld>
             <a:endParaRPr lang="en-GB"/>
           </a:p>
@@ -1967,7 +1973,7 @@
           <a:p>
             <a:fld id="{4B3AA8C6-FF6F-4F8F-942E-89BFB6A8B502}" type="datetimeFigureOut">
               <a:rPr lang="en-GB" smtClean="0"/>
-              <a:t>03/10/2018</a:t>
+              <a:t>06/10/2018</a:t>
             </a:fld>
             <a:endParaRPr lang="en-GB"/>
           </a:p>
@@ -2080,7 +2086,7 @@
           <a:p>
             <a:fld id="{4B3AA8C6-FF6F-4F8F-942E-89BFB6A8B502}" type="datetimeFigureOut">
               <a:rPr lang="en-GB" smtClean="0"/>
-              <a:t>03/10/2018</a:t>
+              <a:t>06/10/2018</a:t>
             </a:fld>
             <a:endParaRPr lang="en-GB"/>
           </a:p>
@@ -2393,7 +2399,7 @@
           <a:p>
             <a:fld id="{4B3AA8C6-FF6F-4F8F-942E-89BFB6A8B502}" type="datetimeFigureOut">
               <a:rPr lang="en-GB" smtClean="0"/>
-              <a:t>03/10/2018</a:t>
+              <a:t>06/10/2018</a:t>
             </a:fld>
             <a:endParaRPr lang="en-GB"/>
           </a:p>
@@ -2682,7 +2688,7 @@
           <a:p>
             <a:fld id="{4B3AA8C6-FF6F-4F8F-942E-89BFB6A8B502}" type="datetimeFigureOut">
               <a:rPr lang="en-GB" smtClean="0"/>
-              <a:t>03/10/2018</a:t>
+              <a:t>06/10/2018</a:t>
             </a:fld>
             <a:endParaRPr lang="en-GB"/>
           </a:p>
@@ -2925,7 +2931,7 @@
           <a:p>
             <a:fld id="{4B3AA8C6-FF6F-4F8F-942E-89BFB6A8B502}" type="datetimeFigureOut">
               <a:rPr lang="en-GB" smtClean="0"/>
-              <a:t>03/10/2018</a:t>
+              <a:t>06/10/2018</a:t>
             </a:fld>
             <a:endParaRPr lang="en-GB"/>
           </a:p>
@@ -3342,8 +3348,8 @@
           <a:chExt cx="0" cy="0"/>
         </a:xfrm>
       </p:grpSpPr>
-      <mc:AlternateContent xmlns:mc="http://schemas.openxmlformats.org/markup-compatibility/2006">
-        <mc:Choice xmlns:am3d="http://schemas.microsoft.com/office/drawing/2017/model3d" Requires="am3d">
+      <mc:AlternateContent xmlns:mc="http://schemas.openxmlformats.org/markup-compatibility/2006" xmlns:am3d="http://schemas.microsoft.com/office/drawing/2017/model3d">
+        <mc:Choice Requires="am3d">
           <p:graphicFrame>
             <p:nvGraphicFramePr>
               <p:cNvPr id="9" name="Modelo 3D 8" descr="Hemisfério Cinza-Escuro">
@@ -3433,7 +3439,7 @@
             </a:graphic>
           </p:graphicFrame>
         </mc:Choice>
-        <mc:Fallback>
+        <mc:Fallback xmlns="">
           <p:pic>
             <p:nvPicPr>
               <p:cNvPr id="9" name="Modelo 3D 8" descr="Hemisfério Cinza-Escuro">
@@ -3449,7 +3455,7 @@
               <p:nvPr/>
             </p:nvPicPr>
             <p:blipFill>
-              <a:blip r:embed="rId3"/>
+              <a:blip r:embed="rId4"/>
               <a:stretch>
                 <a:fillRect/>
               </a:stretch>
@@ -3466,8 +3472,8 @@
           </p:pic>
         </mc:Fallback>
       </mc:AlternateContent>
-      <mc:AlternateContent xmlns:mc="http://schemas.openxmlformats.org/markup-compatibility/2006">
-        <mc:Choice xmlns:am3d="http://schemas.microsoft.com/office/drawing/2017/model3d" Requires="am3d">
+      <mc:AlternateContent xmlns:mc="http://schemas.openxmlformats.org/markup-compatibility/2006" xmlns:am3d="http://schemas.microsoft.com/office/drawing/2017/model3d">
+        <mc:Choice Requires="am3d">
           <p:graphicFrame>
             <p:nvGraphicFramePr>
               <p:cNvPr id="8" name="Modelo 3D 7" descr="Hemisfério Cinza-Escuro">
@@ -3522,7 +3528,7 @@
                     <am3d:postTrans dx="0" dy="0" dz="0"/>
                   </am3d:trans>
                   <am3d:raster rName="Office3DRenderer" rVer="16.0.8326">
-                    <am3d:blip r:embed="rId3"/>
+                    <am3d:blip r:embed="rId4"/>
                   </am3d:raster>
                   <am3d:objViewport viewportSz="3611788"/>
                   <am3d:ambientLight>
@@ -3557,7 +3563,7 @@
             </a:graphic>
           </p:graphicFrame>
         </mc:Choice>
-        <mc:Fallback>
+        <mc:Fallback xmlns="">
           <p:pic>
             <p:nvPicPr>
               <p:cNvPr id="8" name="Modelo 3D 7" descr="Hemisfério Cinza-Escuro">
@@ -3573,7 +3579,7 @@
               <p:nvPr/>
             </p:nvPicPr>
             <p:blipFill>
-              <a:blip r:embed="rId3"/>
+              <a:blip r:embed="rId4"/>
               <a:stretch>
                 <a:fillRect/>
               </a:stretch>
@@ -4051,8 +4057,8 @@
           </a:p>
         </p:txBody>
       </p:sp>
-      <mc:AlternateContent xmlns:mc="http://schemas.openxmlformats.org/markup-compatibility/2006">
-        <mc:Choice xmlns:am3d="http://schemas.microsoft.com/office/drawing/2017/model3d" Requires="am3d">
+      <mc:AlternateContent xmlns:mc="http://schemas.openxmlformats.org/markup-compatibility/2006" xmlns:am3d="http://schemas.microsoft.com/office/drawing/2017/model3d">
+        <mc:Choice Requires="am3d">
           <p:graphicFrame>
             <p:nvGraphicFramePr>
               <p:cNvPr id="7" name="Modelo 3D 6" descr="Beam">
@@ -4079,7 +4085,7 @@
             </p:xfrm>
             <a:graphic>
               <a:graphicData uri="http://schemas.microsoft.com/office/drawing/2017/model3d">
-                <am3d:model3d r:embed="rId4">
+                <am3d:model3d r:embed="rId5">
                   <am3d:spPr>
                     <a:xfrm>
                       <a:off x="0" y="0"/>
@@ -4107,7 +4113,7 @@
                     <am3d:postTrans dx="0" dy="0" dz="0"/>
                   </am3d:trans>
                   <am3d:raster rName="Office3DRenderer" rVer="16.0.8326">
-                    <am3d:blip r:embed="rId5"/>
+                    <am3d:blip r:embed="rId6"/>
                   </am3d:raster>
                   <am3d:objViewport viewportSz="3455743"/>
                   <am3d:ambientLight>
@@ -4142,7 +4148,7 @@
             </a:graphic>
           </p:graphicFrame>
         </mc:Choice>
-        <mc:Fallback>
+        <mc:Fallback xmlns="">
           <p:pic>
             <p:nvPicPr>
               <p:cNvPr id="7" name="Modelo 3D 6" descr="Beam">
@@ -4158,7 +4164,7 @@
               <p:nvPr/>
             </p:nvPicPr>
             <p:blipFill>
-              <a:blip r:embed="rId5"/>
+              <a:blip r:embed="rId7"/>
               <a:stretch>
                 <a:fillRect/>
               </a:stretch>
@@ -4175,10 +4181,1088 @@
           </p:pic>
         </mc:Fallback>
       </mc:AlternateContent>
+      <p:sp>
+        <p:nvSpPr>
+          <p:cNvPr id="16" name="CaixaDeTexto 15">
+            <a:extLst>
+              <a:ext uri="{FF2B5EF4-FFF2-40B4-BE49-F238E27FC236}">
+                <a16:creationId xmlns:a16="http://schemas.microsoft.com/office/drawing/2014/main" id="{F09C9B82-AAD8-4ED2-BE81-7DBC95ACA61D}"/>
+              </a:ext>
+            </a:extLst>
+          </p:cNvPr>
+          <p:cNvSpPr txBox="1"/>
+          <p:nvPr/>
+        </p:nvSpPr>
+        <p:spPr>
+          <a:xfrm>
+            <a:off x="49650" y="25500"/>
+            <a:ext cx="3642407" cy="707886"/>
+          </a:xfrm>
+          <a:prstGeom prst="rect">
+            <a:avLst/>
+          </a:prstGeom>
+          <a:noFill/>
+        </p:spPr>
+        <p:txBody>
+          <a:bodyPr wrap="none" rtlCol="0">
+            <a:spAutoFit/>
+          </a:bodyPr>
+          <a:lstStyle/>
+          <a:p>
+            <a:r>
+              <a:rPr lang="en-GB" sz="4000" b="1" dirty="0"/>
+              <a:t>Bob’s Apparatus</a:t>
+            </a:r>
+            <a:endParaRPr lang="en-GB" sz="4000" b="1" baseline="-25000" dirty="0"/>
+          </a:p>
+        </p:txBody>
+      </p:sp>
+      <p:sp>
+        <p:nvSpPr>
+          <p:cNvPr id="22" name="CaixaDeTexto 21">
+            <a:extLst>
+              <a:ext uri="{FF2B5EF4-FFF2-40B4-BE49-F238E27FC236}">
+                <a16:creationId xmlns:a16="http://schemas.microsoft.com/office/drawing/2014/main" id="{1A279653-7C21-4CC7-9CBD-7578234E7B14}"/>
+              </a:ext>
+            </a:extLst>
+          </p:cNvPr>
+          <p:cNvSpPr txBox="1"/>
+          <p:nvPr/>
+        </p:nvSpPr>
+        <p:spPr>
+          <a:xfrm>
+            <a:off x="4305926" y="3578018"/>
+            <a:ext cx="720069" cy="461665"/>
+          </a:xfrm>
+          <a:prstGeom prst="rect">
+            <a:avLst/>
+          </a:prstGeom>
+          <a:noFill/>
+        </p:spPr>
+        <p:txBody>
+          <a:bodyPr wrap="none" rtlCol="0">
+            <a:spAutoFit/>
+          </a:bodyPr>
+          <a:lstStyle/>
+          <a:p>
+            <a:r>
+              <a:rPr lang="en-GB" sz="2400" b="1" dirty="0"/>
+              <a:t>10%</a:t>
+            </a:r>
+          </a:p>
+        </p:txBody>
+      </p:sp>
+      <p:sp>
+        <p:nvSpPr>
+          <p:cNvPr id="24" name="CaixaDeTexto 23">
+            <a:extLst>
+              <a:ext uri="{FF2B5EF4-FFF2-40B4-BE49-F238E27FC236}">
+                <a16:creationId xmlns:a16="http://schemas.microsoft.com/office/drawing/2014/main" id="{65031747-2074-4596-ADF1-1281F61565DE}"/>
+              </a:ext>
+            </a:extLst>
+          </p:cNvPr>
+          <p:cNvSpPr txBox="1"/>
+          <p:nvPr/>
+        </p:nvSpPr>
+        <p:spPr>
+          <a:xfrm>
+            <a:off x="3879864" y="1473783"/>
+            <a:ext cx="720069" cy="461665"/>
+          </a:xfrm>
+          <a:prstGeom prst="rect">
+            <a:avLst/>
+          </a:prstGeom>
+          <a:noFill/>
+        </p:spPr>
+        <p:txBody>
+          <a:bodyPr wrap="none" rtlCol="0">
+            <a:spAutoFit/>
+          </a:bodyPr>
+          <a:lstStyle/>
+          <a:p>
+            <a:r>
+              <a:rPr lang="en-GB" sz="2400" b="1" dirty="0"/>
+              <a:t>90%</a:t>
+            </a:r>
+          </a:p>
+        </p:txBody>
+      </p:sp>
     </p:spTree>
     <p:extLst>
       <p:ext uri="{BB962C8B-B14F-4D97-AF65-F5344CB8AC3E}">
         <p14:creationId xmlns:p14="http://schemas.microsoft.com/office/powerpoint/2010/main" val="1665577511"/>
+      </p:ext>
+    </p:extLst>
+  </p:cSld>
+  <p:clrMapOvr>
+    <a:masterClrMapping/>
+  </p:clrMapOvr>
+</p:sld>
+</file>
+
+<file path=ppt/slides/slide2.xml><?xml version="1.0" encoding="utf-8"?>
+<p:sld xmlns:a="http://schemas.openxmlformats.org/drawingml/2006/main" xmlns:r="http://schemas.openxmlformats.org/officeDocument/2006/relationships" xmlns:p="http://schemas.openxmlformats.org/presentationml/2006/main">
+  <p:cSld>
+    <p:spTree>
+      <p:nvGrpSpPr>
+        <p:cNvPr id="1" name=""/>
+        <p:cNvGrpSpPr/>
+        <p:nvPr/>
+      </p:nvGrpSpPr>
+      <p:grpSpPr>
+        <a:xfrm>
+          <a:off x="0" y="0"/>
+          <a:ext cx="0" cy="0"/>
+          <a:chOff x="0" y="0"/>
+          <a:chExt cx="0" cy="0"/>
+        </a:xfrm>
+      </p:grpSpPr>
+      <p:sp>
+        <p:nvSpPr>
+          <p:cNvPr id="27" name="Retângulo 26">
+            <a:extLst>
+              <a:ext uri="{FF2B5EF4-FFF2-40B4-BE49-F238E27FC236}">
+                <a16:creationId xmlns:a16="http://schemas.microsoft.com/office/drawing/2014/main" id="{10855063-FB85-4605-A7C1-AA6CB8EEC786}"/>
+              </a:ext>
+            </a:extLst>
+          </p:cNvPr>
+          <p:cNvSpPr/>
+          <p:nvPr/>
+        </p:nvSpPr>
+        <p:spPr>
+          <a:xfrm>
+            <a:off x="870635" y="2794476"/>
+            <a:ext cx="7025679" cy="3059394"/>
+          </a:xfrm>
+          <a:prstGeom prst="rect">
+            <a:avLst/>
+          </a:prstGeom>
+          <a:solidFill>
+            <a:schemeClr val="dk1">
+              <a:alpha val="50000"/>
+            </a:schemeClr>
+          </a:solidFill>
+          <a:ln>
+            <a:noFill/>
+          </a:ln>
+        </p:spPr>
+        <p:style>
+          <a:lnRef idx="0">
+            <a:scrgbClr r="0" g="0" b="0"/>
+          </a:lnRef>
+          <a:fillRef idx="0">
+            <a:scrgbClr r="0" g="0" b="0"/>
+          </a:fillRef>
+          <a:effectRef idx="0">
+            <a:scrgbClr r="0" g="0" b="0"/>
+          </a:effectRef>
+          <a:fontRef idx="minor">
+            <a:schemeClr val="lt1"/>
+          </a:fontRef>
+        </p:style>
+        <p:txBody>
+          <a:bodyPr rtlCol="0" anchor="ctr"/>
+          <a:lstStyle/>
+          <a:p>
+            <a:pPr algn="ctr"/>
+            <a:endParaRPr lang="en-GB" dirty="0"/>
+          </a:p>
+        </p:txBody>
+      </p:sp>
+      <p:sp>
+        <p:nvSpPr>
+          <p:cNvPr id="19" name="CaixaDeTexto 18">
+            <a:extLst>
+              <a:ext uri="{FF2B5EF4-FFF2-40B4-BE49-F238E27FC236}">
+                <a16:creationId xmlns:a16="http://schemas.microsoft.com/office/drawing/2014/main" id="{5CDDC7F4-AD77-4527-B346-621745C88054}"/>
+              </a:ext>
+            </a:extLst>
+          </p:cNvPr>
+          <p:cNvSpPr txBox="1"/>
+          <p:nvPr/>
+        </p:nvSpPr>
+        <p:spPr>
+          <a:xfrm>
+            <a:off x="870635" y="2794475"/>
+            <a:ext cx="2861104" cy="584775"/>
+          </a:xfrm>
+          <a:prstGeom prst="rect">
+            <a:avLst/>
+          </a:prstGeom>
+          <a:noFill/>
+        </p:spPr>
+        <p:txBody>
+          <a:bodyPr wrap="none" rtlCol="0">
+            <a:spAutoFit/>
+          </a:bodyPr>
+          <a:lstStyle/>
+          <a:p>
+            <a:r>
+              <a:rPr lang="en-GB" sz="3200" b="1" dirty="0"/>
+              <a:t>Eve’s Apparatus</a:t>
+            </a:r>
+          </a:p>
+        </p:txBody>
+      </p:sp>
+      <p:sp>
+        <p:nvSpPr>
+          <p:cNvPr id="23" name="CaixaDeTexto 22">
+            <a:extLst>
+              <a:ext uri="{FF2B5EF4-FFF2-40B4-BE49-F238E27FC236}">
+                <a16:creationId xmlns:a16="http://schemas.microsoft.com/office/drawing/2014/main" id="{C1A4275B-C5D6-48B3-9919-735C4C92EC54}"/>
+              </a:ext>
+            </a:extLst>
+          </p:cNvPr>
+          <p:cNvSpPr txBox="1"/>
+          <p:nvPr/>
+        </p:nvSpPr>
+        <p:spPr>
+          <a:xfrm>
+            <a:off x="9145222" y="4751805"/>
+            <a:ext cx="2946063" cy="584775"/>
+          </a:xfrm>
+          <a:prstGeom prst="rect">
+            <a:avLst/>
+          </a:prstGeom>
+          <a:noFill/>
+        </p:spPr>
+        <p:txBody>
+          <a:bodyPr wrap="none" rtlCol="0">
+            <a:spAutoFit/>
+          </a:bodyPr>
+          <a:lstStyle/>
+          <a:p>
+            <a:r>
+              <a:rPr lang="en-GB" sz="3200" b="1" dirty="0"/>
+              <a:t>Bob’s Apparatus</a:t>
+            </a:r>
+            <a:endParaRPr lang="en-GB" sz="3200" b="1" baseline="-25000" dirty="0"/>
+          </a:p>
+        </p:txBody>
+      </p:sp>
+      <p:sp>
+        <p:nvSpPr>
+          <p:cNvPr id="29" name="Arco 28">
+            <a:extLst>
+              <a:ext uri="{FF2B5EF4-FFF2-40B4-BE49-F238E27FC236}">
+                <a16:creationId xmlns:a16="http://schemas.microsoft.com/office/drawing/2014/main" id="{4A3D392B-7738-45F4-8708-760F905462F9}"/>
+              </a:ext>
+            </a:extLst>
+          </p:cNvPr>
+          <p:cNvSpPr/>
+          <p:nvPr/>
+        </p:nvSpPr>
+        <p:spPr>
+          <a:xfrm rot="6985113">
+            <a:off x="2095908" y="839705"/>
+            <a:ext cx="4746140" cy="4641931"/>
+          </a:xfrm>
+          <a:prstGeom prst="arc">
+            <a:avLst>
+              <a:gd name="adj1" fmla="val 15029454"/>
+              <a:gd name="adj2" fmla="val 0"/>
+            </a:avLst>
+          </a:prstGeom>
+          <a:ln w="76200">
+            <a:solidFill>
+              <a:srgbClr val="FF0000"/>
+            </a:solidFill>
+          </a:ln>
+        </p:spPr>
+        <p:style>
+          <a:lnRef idx="1">
+            <a:schemeClr val="accent1"/>
+          </a:lnRef>
+          <a:fillRef idx="0">
+            <a:schemeClr val="accent1"/>
+          </a:fillRef>
+          <a:effectRef idx="0">
+            <a:schemeClr val="accent1"/>
+          </a:effectRef>
+          <a:fontRef idx="minor">
+            <a:schemeClr val="tx1"/>
+          </a:fontRef>
+        </p:style>
+        <p:txBody>
+          <a:bodyPr rtlCol="0" anchor="ctr"/>
+          <a:lstStyle/>
+          <a:p>
+            <a:pPr algn="ctr"/>
+            <a:endParaRPr lang="en-GB"/>
+          </a:p>
+        </p:txBody>
+      </p:sp>
+      <p:sp>
+        <p:nvSpPr>
+          <p:cNvPr id="28" name="Arco 27">
+            <a:extLst>
+              <a:ext uri="{FF2B5EF4-FFF2-40B4-BE49-F238E27FC236}">
+                <a16:creationId xmlns:a16="http://schemas.microsoft.com/office/drawing/2014/main" id="{11EC1C13-0F3E-462C-838B-A571F3D6A30C}"/>
+              </a:ext>
+            </a:extLst>
+          </p:cNvPr>
+          <p:cNvSpPr/>
+          <p:nvPr/>
+        </p:nvSpPr>
+        <p:spPr>
+          <a:xfrm rot="10800000">
+            <a:off x="6569712" y="1788490"/>
+            <a:ext cx="5281670" cy="3509286"/>
+          </a:xfrm>
+          <a:prstGeom prst="arc">
+            <a:avLst>
+              <a:gd name="adj1" fmla="val 16530333"/>
+              <a:gd name="adj2" fmla="val 0"/>
+            </a:avLst>
+          </a:prstGeom>
+          <a:ln w="76200">
+            <a:solidFill>
+              <a:srgbClr val="FF0000"/>
+            </a:solidFill>
+          </a:ln>
+        </p:spPr>
+        <p:style>
+          <a:lnRef idx="1">
+            <a:schemeClr val="accent1"/>
+          </a:lnRef>
+          <a:fillRef idx="0">
+            <a:schemeClr val="accent1"/>
+          </a:fillRef>
+          <a:effectRef idx="0">
+            <a:schemeClr val="accent1"/>
+          </a:effectRef>
+          <a:fontRef idx="minor">
+            <a:schemeClr val="tx1"/>
+          </a:fontRef>
+        </p:style>
+        <p:txBody>
+          <a:bodyPr rtlCol="0" anchor="ctr"/>
+          <a:lstStyle/>
+          <a:p>
+            <a:pPr algn="ctr"/>
+            <a:endParaRPr lang="en-GB"/>
+          </a:p>
+        </p:txBody>
+      </p:sp>
+      <p:sp>
+        <p:nvSpPr>
+          <p:cNvPr id="22" name="CaixaDeTexto 21">
+            <a:extLst>
+              <a:ext uri="{FF2B5EF4-FFF2-40B4-BE49-F238E27FC236}">
+                <a16:creationId xmlns:a16="http://schemas.microsoft.com/office/drawing/2014/main" id="{4BEB1DE5-8DD9-4DB8-B92B-4779C559B3F2}"/>
+              </a:ext>
+            </a:extLst>
+          </p:cNvPr>
+          <p:cNvSpPr txBox="1"/>
+          <p:nvPr/>
+        </p:nvSpPr>
+        <p:spPr>
+          <a:xfrm>
+            <a:off x="93504" y="1705452"/>
+            <a:ext cx="3103157" cy="584775"/>
+          </a:xfrm>
+          <a:prstGeom prst="rect">
+            <a:avLst/>
+          </a:prstGeom>
+          <a:noFill/>
+        </p:spPr>
+        <p:txBody>
+          <a:bodyPr wrap="none" rtlCol="0">
+            <a:spAutoFit/>
+          </a:bodyPr>
+          <a:lstStyle/>
+          <a:p>
+            <a:r>
+              <a:rPr lang="en-GB" sz="3200" b="1" dirty="0"/>
+              <a:t>Alice’s Apparatus</a:t>
+            </a:r>
+          </a:p>
+        </p:txBody>
+      </p:sp>
+      <p:cxnSp>
+        <p:nvCxnSpPr>
+          <p:cNvPr id="25" name="Conexão reta 24">
+            <a:extLst>
+              <a:ext uri="{FF2B5EF4-FFF2-40B4-BE49-F238E27FC236}">
+                <a16:creationId xmlns:a16="http://schemas.microsoft.com/office/drawing/2014/main" id="{BEBA948E-307F-4D29-8205-715CE2873EB5}"/>
+              </a:ext>
+            </a:extLst>
+          </p:cNvPr>
+          <p:cNvCxnSpPr>
+            <a:cxnSpLocks/>
+          </p:cNvCxnSpPr>
+          <p:nvPr/>
+        </p:nvCxnSpPr>
+        <p:spPr>
+          <a:xfrm>
+            <a:off x="1989356" y="940037"/>
+            <a:ext cx="7949403" cy="4913832"/>
+          </a:xfrm>
+          <a:prstGeom prst="line">
+            <a:avLst/>
+          </a:prstGeom>
+          <a:ln w="76200">
+            <a:solidFill>
+              <a:schemeClr val="accent4"/>
+            </a:solidFill>
+          </a:ln>
+        </p:spPr>
+        <p:style>
+          <a:lnRef idx="1">
+            <a:schemeClr val="accent1"/>
+          </a:lnRef>
+          <a:fillRef idx="0">
+            <a:schemeClr val="accent1"/>
+          </a:fillRef>
+          <a:effectRef idx="0">
+            <a:schemeClr val="accent1"/>
+          </a:effectRef>
+          <a:fontRef idx="minor">
+            <a:schemeClr val="tx1"/>
+          </a:fontRef>
+        </p:style>
+      </p:cxnSp>
+      <mc:AlternateContent xmlns:mc="http://schemas.openxmlformats.org/markup-compatibility/2006" xmlns:am3d="http://schemas.microsoft.com/office/drawing/2017/model3d">
+        <mc:Choice Requires="am3d">
+          <p:graphicFrame>
+            <p:nvGraphicFramePr>
+              <p:cNvPr id="7" name="Modelo 3D 6" descr="Beam">
+                <a:extLst>
+                  <a:ext uri="{FF2B5EF4-FFF2-40B4-BE49-F238E27FC236}">
+                    <a16:creationId xmlns:a16="http://schemas.microsoft.com/office/drawing/2014/main" id="{89BBA01E-727C-483D-8EF0-EE2062EE90C6}"/>
+                  </a:ext>
+                </a:extLst>
+              </p:cNvPr>
+              <p:cNvGraphicFramePr>
+                <a:graphicFrameLocks noChangeAspect="1"/>
+              </p:cNvGraphicFramePr>
+              <p:nvPr>
+                <p:extLst>
+                  <p:ext uri="{D42A27DB-BD31-4B8C-83A1-F6EECF244321}">
+                    <p14:modId xmlns:p14="http://schemas.microsoft.com/office/powerpoint/2010/main" val="201171710"/>
+                  </p:ext>
+                </p:extLst>
+              </p:nvPr>
+            </p:nvGraphicFramePr>
+            <p:xfrm>
+              <a:off x="5885135" y="3014189"/>
+              <a:ext cx="1202819" cy="1248114"/>
+            </p:xfrm>
+            <a:graphic>
+              <a:graphicData uri="http://schemas.microsoft.com/office/drawing/2017/model3d">
+                <am3d:model3d r:embed="rId2">
+                  <am3d:spPr>
+                    <a:xfrm>
+                      <a:off x="0" y="0"/>
+                      <a:ext cx="1202819" cy="1248114"/>
+                    </a:xfrm>
+                    <a:prstGeom prst="rect">
+                      <a:avLst/>
+                    </a:prstGeom>
+                  </am3d:spPr>
+                  <am3d:camera>
+                    <am3d:pos x="0" y="0" z="81469193"/>
+                    <am3d:up dx="0" dy="36000000" dz="0"/>
+                    <am3d:lookAt x="0" y="0" z="0"/>
+                    <am3d:perspective fov="2700000"/>
+                  </am3d:camera>
+                  <am3d:trans>
+                    <am3d:meterPerModelUnit n="7140529" d="1000000"/>
+                    <am3d:preTrans dx="0" dy="-17999995" dz="5866"/>
+                    <am3d:scale>
+                      <am3d:sx n="1000000" d="1000000"/>
+                      <am3d:sy n="1000000" d="1000000"/>
+                      <am3d:sz n="1000000" d="1000000"/>
+                    </am3d:scale>
+                    <am3d:rot ax="16200000" ay="18000000" az="5400000"/>
+                    <am3d:postTrans dx="0" dy="0" dz="0"/>
+                  </am3d:trans>
+                  <am3d:raster rName="Office3DRenderer" rVer="16.0.8326">
+                    <am3d:blip r:embed="rId3"/>
+                  </am3d:raster>
+                  <am3d:objViewport viewportSz="1574409"/>
+                  <am3d:ambientLight>
+                    <am3d:clr>
+                      <a:scrgbClr r="50000" g="50000" b="50000"/>
+                    </am3d:clr>
+                    <am3d:illuminance n="500000" d="1000000"/>
+                  </am3d:ambientLight>
+                  <am3d:ptLight rad="0">
+                    <am3d:clr>
+                      <a:scrgbClr r="100000" g="75000" b="50000"/>
+                    </am3d:clr>
+                    <am3d:intensity n="9765625" d="1000000"/>
+                    <am3d:pos x="21959998" y="70920001" z="16344003"/>
+                  </am3d:ptLight>
+                  <am3d:ptLight rad="0">
+                    <am3d:clr>
+                      <a:scrgbClr r="40000" g="60000" b="95000"/>
+                    </am3d:clr>
+                    <am3d:intensity n="12250000" d="1000000"/>
+                    <am3d:pos x="-37964106" y="51130435" z="57631972"/>
+                  </am3d:ptLight>
+                  <am3d:ptLight rad="0">
+                    <am3d:clr>
+                      <a:scrgbClr r="86837" g="72700" b="100000"/>
+                    </am3d:clr>
+                    <am3d:intensity n="3125000" d="1000000"/>
+                    <am3d:pos x="-37739122" y="58056624" z="-34769649"/>
+                  </am3d:ptLight>
+                </am3d:model3d>
+              </a:graphicData>
+            </a:graphic>
+          </p:graphicFrame>
+        </mc:Choice>
+        <mc:Fallback xmlns="">
+          <p:pic>
+            <p:nvPicPr>
+              <p:cNvPr id="7" name="Modelo 3D 6" descr="Beam">
+                <a:extLst>
+                  <a:ext uri="{FF2B5EF4-FFF2-40B4-BE49-F238E27FC236}">
+                    <a16:creationId xmlns:a16="http://schemas.microsoft.com/office/drawing/2014/main" id="{89BBA01E-727C-483D-8EF0-EE2062EE90C6}"/>
+                  </a:ext>
+                </a:extLst>
+              </p:cNvPr>
+              <p:cNvPicPr>
+                <a:picLocks noGrp="1" noRot="1" noChangeAspect="1" noMove="1" noResize="1" noEditPoints="1" noAdjustHandles="1" noChangeArrowheads="1" noChangeShapeType="1" noCrop="1"/>
+              </p:cNvPicPr>
+              <p:nvPr/>
+            </p:nvPicPr>
+            <p:blipFill>
+              <a:blip r:embed="rId4"/>
+              <a:stretch>
+                <a:fillRect/>
+              </a:stretch>
+            </p:blipFill>
+            <p:spPr>
+              <a:xfrm>
+                <a:off x="5885135" y="3014189"/>
+                <a:ext cx="1202819" cy="1248114"/>
+              </a:xfrm>
+              <a:prstGeom prst="rect">
+                <a:avLst/>
+              </a:prstGeom>
+            </p:spPr>
+          </p:pic>
+        </mc:Fallback>
+      </mc:AlternateContent>
+      <p:sp>
+        <p:nvSpPr>
+          <p:cNvPr id="30" name="CaixaDeTexto 29">
+            <a:extLst>
+              <a:ext uri="{FF2B5EF4-FFF2-40B4-BE49-F238E27FC236}">
+                <a16:creationId xmlns:a16="http://schemas.microsoft.com/office/drawing/2014/main" id="{1B36C2F3-2FB1-4998-BC14-DFC648011A27}"/>
+              </a:ext>
+            </a:extLst>
+          </p:cNvPr>
+          <p:cNvSpPr txBox="1"/>
+          <p:nvPr/>
+        </p:nvSpPr>
+        <p:spPr>
+          <a:xfrm>
+            <a:off x="7269398" y="3862508"/>
+            <a:ext cx="564578" cy="461665"/>
+          </a:xfrm>
+          <a:prstGeom prst="rect">
+            <a:avLst/>
+          </a:prstGeom>
+          <a:noFill/>
+        </p:spPr>
+        <p:txBody>
+          <a:bodyPr wrap="none" rtlCol="0">
+            <a:spAutoFit/>
+          </a:bodyPr>
+          <a:lstStyle/>
+          <a:p>
+            <a:r>
+              <a:rPr lang="en-GB" sz="2400" b="1" dirty="0"/>
+              <a:t>0%</a:t>
+            </a:r>
+          </a:p>
+        </p:txBody>
+      </p:sp>
+      <p:sp>
+        <p:nvSpPr>
+          <p:cNvPr id="31" name="CaixaDeTexto 30">
+            <a:extLst>
+              <a:ext uri="{FF2B5EF4-FFF2-40B4-BE49-F238E27FC236}">
+                <a16:creationId xmlns:a16="http://schemas.microsoft.com/office/drawing/2014/main" id="{5F3267E4-6EC2-463F-9907-03515D968527}"/>
+              </a:ext>
+            </a:extLst>
+          </p:cNvPr>
+          <p:cNvSpPr txBox="1"/>
+          <p:nvPr/>
+        </p:nvSpPr>
+        <p:spPr>
+          <a:xfrm>
+            <a:off x="6829710" y="4637768"/>
+            <a:ext cx="516488" cy="461665"/>
+          </a:xfrm>
+          <a:prstGeom prst="rect">
+            <a:avLst/>
+          </a:prstGeom>
+          <a:noFill/>
+        </p:spPr>
+        <p:txBody>
+          <a:bodyPr wrap="none" rtlCol="0">
+            <a:spAutoFit/>
+          </a:bodyPr>
+          <a:lstStyle/>
+          <a:p>
+            <a:r>
+              <a:rPr lang="en-GB" sz="2400" b="1" dirty="0"/>
+              <a:t>t%</a:t>
+            </a:r>
+          </a:p>
+        </p:txBody>
+      </p:sp>
+      <p:sp>
+        <p:nvSpPr>
+          <p:cNvPr id="32" name="CaixaDeTexto 31">
+            <a:extLst>
+              <a:ext uri="{FF2B5EF4-FFF2-40B4-BE49-F238E27FC236}">
+                <a16:creationId xmlns:a16="http://schemas.microsoft.com/office/drawing/2014/main" id="{DFEE8F73-6109-48F4-8865-CB1F756651F0}"/>
+              </a:ext>
+            </a:extLst>
+          </p:cNvPr>
+          <p:cNvSpPr txBox="1"/>
+          <p:nvPr/>
+        </p:nvSpPr>
+        <p:spPr>
+          <a:xfrm>
+            <a:off x="5387370" y="4254113"/>
+            <a:ext cx="958917" cy="461665"/>
+          </a:xfrm>
+          <a:prstGeom prst="rect">
+            <a:avLst/>
+          </a:prstGeom>
+          <a:noFill/>
+        </p:spPr>
+        <p:txBody>
+          <a:bodyPr wrap="none" rtlCol="0">
+            <a:spAutoFit/>
+          </a:bodyPr>
+          <a:lstStyle/>
+          <a:p>
+            <a:r>
+              <a:rPr lang="en-GB" sz="2400" b="1" dirty="0"/>
+              <a:t>(1-t)%</a:t>
+            </a:r>
+          </a:p>
+        </p:txBody>
+      </p:sp>
+      <mc:AlternateContent xmlns:mc="http://schemas.openxmlformats.org/markup-compatibility/2006" xmlns:am3d="http://schemas.microsoft.com/office/drawing/2017/model3d">
+        <mc:Choice Requires="am3d">
+          <p:graphicFrame>
+            <p:nvGraphicFramePr>
+              <p:cNvPr id="34" name="Modelo 3D 33" descr="Cuboide Cinza-Claro">
+                <a:extLst>
+                  <a:ext uri="{FF2B5EF4-FFF2-40B4-BE49-F238E27FC236}">
+                    <a16:creationId xmlns:a16="http://schemas.microsoft.com/office/drawing/2014/main" id="{380C57D9-CA4B-4670-B753-BCC14281F462}"/>
+                  </a:ext>
+                </a:extLst>
+              </p:cNvPr>
+              <p:cNvGraphicFramePr>
+                <a:graphicFrameLocks noChangeAspect="1"/>
+              </p:cNvGraphicFramePr>
+              <p:nvPr>
+                <p:extLst>
+                  <p:ext uri="{D42A27DB-BD31-4B8C-83A1-F6EECF244321}">
+                    <p14:modId xmlns:p14="http://schemas.microsoft.com/office/powerpoint/2010/main" val="4102625734"/>
+                  </p:ext>
+                </p:extLst>
+              </p:nvPr>
+            </p:nvGraphicFramePr>
+            <p:xfrm>
+              <a:off x="9348521" y="5021892"/>
+              <a:ext cx="2539467" cy="1544097"/>
+            </p:xfrm>
+            <a:graphic>
+              <a:graphicData uri="http://schemas.microsoft.com/office/drawing/2017/model3d">
+                <am3d:model3d r:embed="rId5">
+                  <am3d:spPr>
+                    <a:xfrm>
+                      <a:off x="0" y="0"/>
+                      <a:ext cx="2539467" cy="1544097"/>
+                    </a:xfrm>
+                    <a:prstGeom prst="rect">
+                      <a:avLst/>
+                    </a:prstGeom>
+                  </am3d:spPr>
+                  <am3d:camera>
+                    <am3d:pos x="0" y="0" z="57664451"/>
+                    <am3d:up dx="0" dy="36000000" dz="0"/>
+                    <am3d:lookAt x="0" y="0" z="0"/>
+                    <am3d:perspective fov="2700000"/>
+                  </am3d:camera>
+                  <am3d:trans>
+                    <am3d:meterPerModelUnit n="4361393" d="1000000"/>
+                    <am3d:preTrans dx="0" dy="-6493603" dz="0"/>
+                    <am3d:scale>
+                      <am3d:sx n="1000000" d="1000000"/>
+                      <am3d:sy n="1000000" d="1000000"/>
+                      <am3d:sz n="1000000" d="1000000"/>
+                    </am3d:scale>
+                    <am3d:rot ax="7192918" ay="3895266" az="7343495"/>
+                    <am3d:postTrans dx="0" dy="0" dz="0"/>
+                  </am3d:trans>
+                  <am3d:raster rName="Office3DRenderer" rVer="16.0.8326">
+                    <am3d:blip r:embed="rId6"/>
+                  </am3d:raster>
+                  <am3d:objViewport viewportSz="2580377"/>
+                  <am3d:ambientLight>
+                    <am3d:clr>
+                      <a:scrgbClr r="50000" g="50000" b="50000"/>
+                    </am3d:clr>
+                    <am3d:illuminance n="500000" d="1000000"/>
+                  </am3d:ambientLight>
+                  <am3d:ptLight rad="0">
+                    <am3d:clr>
+                      <a:scrgbClr r="100000" g="75000" b="50000"/>
+                    </am3d:clr>
+                    <am3d:intensity n="9765625" d="1000000"/>
+                    <am3d:pos x="21959998" y="70920001" z="16344003"/>
+                  </am3d:ptLight>
+                  <am3d:ptLight rad="0">
+                    <am3d:clr>
+                      <a:scrgbClr r="40000" g="60000" b="95000"/>
+                    </am3d:clr>
+                    <am3d:intensity n="12250000" d="1000000"/>
+                    <am3d:pos x="-37964106" y="51130435" z="57631972"/>
+                  </am3d:ptLight>
+                  <am3d:ptLight rad="0">
+                    <am3d:clr>
+                      <a:scrgbClr r="86837" g="72700" b="100000"/>
+                    </am3d:clr>
+                    <am3d:intensity n="3125000" d="1000000"/>
+                    <am3d:pos x="-37739122" y="58056624" z="-34769649"/>
+                  </am3d:ptLight>
+                </am3d:model3d>
+              </a:graphicData>
+            </a:graphic>
+          </p:graphicFrame>
+        </mc:Choice>
+        <mc:Fallback xmlns="">
+          <p:pic>
+            <p:nvPicPr>
+              <p:cNvPr id="34" name="Modelo 3D 33" descr="Cuboide Cinza-Claro">
+                <a:extLst>
+                  <a:ext uri="{FF2B5EF4-FFF2-40B4-BE49-F238E27FC236}">
+                    <a16:creationId xmlns:a16="http://schemas.microsoft.com/office/drawing/2014/main" id="{380C57D9-CA4B-4670-B753-BCC14281F462}"/>
+                  </a:ext>
+                </a:extLst>
+              </p:cNvPr>
+              <p:cNvPicPr>
+                <a:picLocks noGrp="1" noRot="1" noChangeAspect="1" noMove="1" noResize="1" noEditPoints="1" noAdjustHandles="1" noChangeArrowheads="1" noChangeShapeType="1" noCrop="1"/>
+              </p:cNvPicPr>
+              <p:nvPr/>
+            </p:nvPicPr>
+            <p:blipFill>
+              <a:blip r:embed="rId7"/>
+              <a:stretch>
+                <a:fillRect/>
+              </a:stretch>
+            </p:blipFill>
+            <p:spPr>
+              <a:xfrm>
+                <a:off x="9348521" y="5021892"/>
+                <a:ext cx="2539467" cy="1544097"/>
+              </a:xfrm>
+              <a:prstGeom prst="rect">
+                <a:avLst/>
+              </a:prstGeom>
+            </p:spPr>
+          </p:pic>
+        </mc:Fallback>
+      </mc:AlternateContent>
+      <mc:AlternateContent xmlns:mc="http://schemas.openxmlformats.org/markup-compatibility/2006" xmlns:am3d="http://schemas.microsoft.com/office/drawing/2017/model3d">
+        <mc:Choice Requires="am3d">
+          <p:graphicFrame>
+            <p:nvGraphicFramePr>
+              <p:cNvPr id="35" name="Modelo 3D 34" descr="Cuboide Cinza-Claro">
+                <a:extLst>
+                  <a:ext uri="{FF2B5EF4-FFF2-40B4-BE49-F238E27FC236}">
+                    <a16:creationId xmlns:a16="http://schemas.microsoft.com/office/drawing/2014/main" id="{C9C8C47D-D33A-46FF-8142-0299501C2C8A}"/>
+                  </a:ext>
+                </a:extLst>
+              </p:cNvPr>
+              <p:cNvGraphicFramePr>
+                <a:graphicFrameLocks noChangeAspect="1"/>
+              </p:cNvGraphicFramePr>
+              <p:nvPr>
+                <p:extLst>
+                  <p:ext uri="{D42A27DB-BD31-4B8C-83A1-F6EECF244321}">
+                    <p14:modId xmlns:p14="http://schemas.microsoft.com/office/powerpoint/2010/main" val="405793456"/>
+                  </p:ext>
+                </p:extLst>
+              </p:nvPr>
+            </p:nvGraphicFramePr>
+            <p:xfrm>
+              <a:off x="27382" y="-113613"/>
+              <a:ext cx="2484702" cy="1965923"/>
+            </p:xfrm>
+            <a:graphic>
+              <a:graphicData uri="http://schemas.microsoft.com/office/drawing/2017/model3d">
+                <am3d:model3d r:embed="rId5">
+                  <am3d:spPr>
+                    <a:xfrm>
+                      <a:off x="0" y="0"/>
+                      <a:ext cx="2484702" cy="1965923"/>
+                    </a:xfrm>
+                    <a:prstGeom prst="rect">
+                      <a:avLst/>
+                    </a:prstGeom>
+                  </am3d:spPr>
+                  <am3d:camera>
+                    <am3d:pos x="0" y="0" z="57664451"/>
+                    <am3d:up dx="0" dy="36000000" dz="0"/>
+                    <am3d:lookAt x="0" y="0" z="0"/>
+                    <am3d:perspective fov="2700000"/>
+                  </am3d:camera>
+                  <am3d:trans>
+                    <am3d:meterPerModelUnit n="4361393" d="1000000"/>
+                    <am3d:preTrans dx="0" dy="-6493603" dz="0"/>
+                    <am3d:scale>
+                      <am3d:sx n="1000000" d="1000000"/>
+                      <am3d:sy n="1000000" d="1000000"/>
+                      <am3d:sz n="1000000" d="1000000"/>
+                    </am3d:scale>
+                    <am3d:rot ax="1719724" ay="2708621" az="1270836"/>
+                    <am3d:postTrans dx="0" dy="0" dz="0"/>
+                  </am3d:trans>
+                  <am3d:raster rName="Office3DRenderer" rVer="16.0.8326">
+                    <am3d:blip r:embed="rId8"/>
+                  </am3d:raster>
+                  <am3d:objViewport viewportSz="2580374"/>
+                  <am3d:ambientLight>
+                    <am3d:clr>
+                      <a:scrgbClr r="50000" g="50000" b="50000"/>
+                    </am3d:clr>
+                    <am3d:illuminance n="500000" d="1000000"/>
+                  </am3d:ambientLight>
+                  <am3d:ptLight rad="0">
+                    <am3d:clr>
+                      <a:scrgbClr r="100000" g="75000" b="50000"/>
+                    </am3d:clr>
+                    <am3d:intensity n="9765625" d="1000000"/>
+                    <am3d:pos x="21959998" y="70920001" z="16344003"/>
+                  </am3d:ptLight>
+                  <am3d:ptLight rad="0">
+                    <am3d:clr>
+                      <a:scrgbClr r="40000" g="60000" b="95000"/>
+                    </am3d:clr>
+                    <am3d:intensity n="12250000" d="1000000"/>
+                    <am3d:pos x="-37964106" y="51130435" z="57631972"/>
+                  </am3d:ptLight>
+                  <am3d:ptLight rad="0">
+                    <am3d:clr>
+                      <a:scrgbClr r="86837" g="72700" b="100000"/>
+                    </am3d:clr>
+                    <am3d:intensity n="3125000" d="1000000"/>
+                    <am3d:pos x="-37739122" y="58056624" z="-34769649"/>
+                  </am3d:ptLight>
+                </am3d:model3d>
+              </a:graphicData>
+            </a:graphic>
+          </p:graphicFrame>
+        </mc:Choice>
+        <mc:Fallback xmlns="">
+          <p:pic>
+            <p:nvPicPr>
+              <p:cNvPr id="35" name="Modelo 3D 34" descr="Cuboide Cinza-Claro">
+                <a:extLst>
+                  <a:ext uri="{FF2B5EF4-FFF2-40B4-BE49-F238E27FC236}">
+                    <a16:creationId xmlns:a16="http://schemas.microsoft.com/office/drawing/2014/main" id="{C9C8C47D-D33A-46FF-8142-0299501C2C8A}"/>
+                  </a:ext>
+                </a:extLst>
+              </p:cNvPr>
+              <p:cNvPicPr>
+                <a:picLocks noGrp="1" noRot="1" noChangeAspect="1" noMove="1" noResize="1" noEditPoints="1" noAdjustHandles="1" noChangeArrowheads="1" noChangeShapeType="1" noCrop="1"/>
+              </p:cNvPicPr>
+              <p:nvPr/>
+            </p:nvPicPr>
+            <p:blipFill>
+              <a:blip r:embed="rId9"/>
+              <a:stretch>
+                <a:fillRect/>
+              </a:stretch>
+            </p:blipFill>
+            <p:spPr>
+              <a:xfrm>
+                <a:off x="27382" y="-113613"/>
+                <a:ext cx="2484702" cy="1965923"/>
+              </a:xfrm>
+              <a:prstGeom prst="rect">
+                <a:avLst/>
+              </a:prstGeom>
+            </p:spPr>
+          </p:pic>
+        </mc:Fallback>
+      </mc:AlternateContent>
+      <mc:AlternateContent xmlns:mc="http://schemas.openxmlformats.org/markup-compatibility/2006" xmlns:am3d="http://schemas.microsoft.com/office/drawing/2017/model3d">
+        <mc:Choice Requires="am3d">
+          <p:graphicFrame>
+            <p:nvGraphicFramePr>
+              <p:cNvPr id="38" name="Modelo 3D 37" descr="Cuboide Cinza-Escuro">
+                <a:extLst>
+                  <a:ext uri="{FF2B5EF4-FFF2-40B4-BE49-F238E27FC236}">
+                    <a16:creationId xmlns:a16="http://schemas.microsoft.com/office/drawing/2014/main" id="{AB42B42F-5CAF-4B76-968E-3A216E4F78C6}"/>
+                  </a:ext>
+                </a:extLst>
+              </p:cNvPr>
+              <p:cNvGraphicFramePr>
+                <a:graphicFrameLocks noChangeAspect="1"/>
+              </p:cNvGraphicFramePr>
+              <p:nvPr>
+                <p:extLst>
+                  <p:ext uri="{D42A27DB-BD31-4B8C-83A1-F6EECF244321}">
+                    <p14:modId xmlns:p14="http://schemas.microsoft.com/office/powerpoint/2010/main" val="283850834"/>
+                  </p:ext>
+                </p:extLst>
+              </p:nvPr>
+            </p:nvGraphicFramePr>
+            <p:xfrm>
+              <a:off x="1025576" y="4020671"/>
+              <a:ext cx="2576043" cy="1390215"/>
+            </p:xfrm>
+            <a:graphic>
+              <a:graphicData uri="http://schemas.microsoft.com/office/drawing/2017/model3d">
+                <am3d:model3d r:embed="rId10">
+                  <am3d:spPr>
+                    <a:xfrm>
+                      <a:off x="0" y="0"/>
+                      <a:ext cx="2576043" cy="1390215"/>
+                    </a:xfrm>
+                    <a:prstGeom prst="rect">
+                      <a:avLst/>
+                    </a:prstGeom>
+                  </am3d:spPr>
+                  <am3d:camera>
+                    <am3d:pos x="0" y="0" z="57664451"/>
+                    <am3d:up dx="0" dy="36000000" dz="0"/>
+                    <am3d:lookAt x="0" y="0" z="0"/>
+                    <am3d:perspective fov="2700000"/>
+                  </am3d:camera>
+                  <am3d:trans>
+                    <am3d:meterPerModelUnit n="4361393" d="1000000"/>
+                    <am3d:preTrans dx="0" dy="-6493603" dz="0"/>
+                    <am3d:scale>
+                      <am3d:sx n="1000000" d="1000000"/>
+                      <am3d:sy n="1000000" d="1000000"/>
+                      <am3d:sz n="1000000" d="1000000"/>
+                    </am3d:scale>
+                    <am3d:rot ax="5400000" ay="3600000" az="5400000"/>
+                    <am3d:postTrans dx="0" dy="0" dz="0"/>
+                  </am3d:trans>
+                  <am3d:raster rName="Office3DRenderer" rVer="16.0.8326">
+                    <am3d:blip r:embed="rId11"/>
+                  </am3d:raster>
+                  <am3d:objViewport viewportSz="2661617"/>
+                  <am3d:ambientLight>
+                    <am3d:clr>
+                      <a:scrgbClr r="50000" g="50000" b="50000"/>
+                    </am3d:clr>
+                    <am3d:illuminance n="500000" d="1000000"/>
+                  </am3d:ambientLight>
+                  <am3d:ptLight rad="0">
+                    <am3d:clr>
+                      <a:scrgbClr r="100000" g="75000" b="50000"/>
+                    </am3d:clr>
+                    <am3d:intensity n="9765625" d="1000000"/>
+                    <am3d:pos x="21959998" y="70920001" z="16344003"/>
+                  </am3d:ptLight>
+                  <am3d:ptLight rad="0">
+                    <am3d:clr>
+                      <a:scrgbClr r="40000" g="60000" b="95000"/>
+                    </am3d:clr>
+                    <am3d:intensity n="12250000" d="1000000"/>
+                    <am3d:pos x="-37964106" y="51130435" z="57631972"/>
+                  </am3d:ptLight>
+                  <am3d:ptLight rad="0">
+                    <am3d:clr>
+                      <a:scrgbClr r="86837" g="72700" b="100000"/>
+                    </am3d:clr>
+                    <am3d:intensity n="3125000" d="1000000"/>
+                    <am3d:pos x="-37739122" y="58056624" z="-34769649"/>
+                  </am3d:ptLight>
+                </am3d:model3d>
+              </a:graphicData>
+            </a:graphic>
+          </p:graphicFrame>
+        </mc:Choice>
+        <mc:Fallback xmlns="">
+          <p:pic>
+            <p:nvPicPr>
+              <p:cNvPr id="38" name="Modelo 3D 37" descr="Cuboide Cinza-Escuro">
+                <a:extLst>
+                  <a:ext uri="{FF2B5EF4-FFF2-40B4-BE49-F238E27FC236}">
+                    <a16:creationId xmlns:a16="http://schemas.microsoft.com/office/drawing/2014/main" id="{AB42B42F-5CAF-4B76-968E-3A216E4F78C6}"/>
+                  </a:ext>
+                </a:extLst>
+              </p:cNvPr>
+              <p:cNvPicPr>
+                <a:picLocks noGrp="1" noRot="1" noChangeAspect="1" noMove="1" noResize="1" noEditPoints="1" noAdjustHandles="1" noChangeArrowheads="1" noChangeShapeType="1" noCrop="1"/>
+              </p:cNvPicPr>
+              <p:nvPr/>
+            </p:nvPicPr>
+            <p:blipFill>
+              <a:blip r:embed="rId12"/>
+              <a:stretch>
+                <a:fillRect/>
+              </a:stretch>
+            </p:blipFill>
+            <p:spPr>
+              <a:xfrm>
+                <a:off x="1025576" y="4020671"/>
+                <a:ext cx="2576043" cy="1390215"/>
+              </a:xfrm>
+              <a:prstGeom prst="rect">
+                <a:avLst/>
+              </a:prstGeom>
+            </p:spPr>
+          </p:pic>
+        </mc:Fallback>
+      </mc:AlternateContent>
+      <p:sp>
+        <p:nvSpPr>
+          <p:cNvPr id="18" name="CaixaDeTexto 17">
+            <a:extLst>
+              <a:ext uri="{FF2B5EF4-FFF2-40B4-BE49-F238E27FC236}">
+                <a16:creationId xmlns:a16="http://schemas.microsoft.com/office/drawing/2014/main" id="{D2687353-C682-45B3-AE3A-9642BC8482FF}"/>
+              </a:ext>
+            </a:extLst>
+          </p:cNvPr>
+          <p:cNvSpPr txBox="1"/>
+          <p:nvPr/>
+        </p:nvSpPr>
+        <p:spPr>
+          <a:xfrm>
+            <a:off x="5387370" y="3133168"/>
+            <a:ext cx="2370970" cy="584775"/>
+          </a:xfrm>
+          <a:prstGeom prst="rect">
+            <a:avLst/>
+          </a:prstGeom>
+          <a:noFill/>
+        </p:spPr>
+        <p:txBody>
+          <a:bodyPr wrap="none" rtlCol="0">
+            <a:spAutoFit/>
+          </a:bodyPr>
+          <a:lstStyle/>
+          <a:p>
+            <a:r>
+              <a:rPr lang="en-GB" sz="3200" b="1" dirty="0" err="1"/>
+              <a:t>Beamsplitter</a:t>
+            </a:r>
+            <a:endParaRPr lang="en-GB" sz="4000" b="1" dirty="0"/>
+          </a:p>
+        </p:txBody>
+      </p:sp>
+    </p:spTree>
+    <p:extLst>
+      <p:ext uri="{BB962C8B-B14F-4D97-AF65-F5344CB8AC3E}">
+        <p14:creationId xmlns:p14="http://schemas.microsoft.com/office/powerpoint/2010/main" val="2919146019"/>
       </p:ext>
     </p:extLst>
   </p:cSld>

</xml_diff>

<commit_message>
8 slides com um inacabado ainda
</commit_message>
<xml_diff>
--- a/doc/tex/sdf/tq_76558_cow_protocol/figures_raw/Bob.pptx
+++ b/doc/tex/sdf/tq_76558_cow_protocol/figures_raw/Bob.pptx
@@ -262,7 +262,7 @@
           <a:p>
             <a:fld id="{4B3AA8C6-FF6F-4F8F-942E-89BFB6A8B502}" type="datetimeFigureOut">
               <a:rPr lang="en-GB" smtClean="0"/>
-              <a:t>06/10/2018</a:t>
+              <a:t>15/10/2018</a:t>
             </a:fld>
             <a:endParaRPr lang="en-GB"/>
           </a:p>
@@ -462,7 +462,7 @@
           <a:p>
             <a:fld id="{4B3AA8C6-FF6F-4F8F-942E-89BFB6A8B502}" type="datetimeFigureOut">
               <a:rPr lang="en-GB" smtClean="0"/>
-              <a:t>06/10/2018</a:t>
+              <a:t>15/10/2018</a:t>
             </a:fld>
             <a:endParaRPr lang="en-GB"/>
           </a:p>
@@ -672,7 +672,7 @@
           <a:p>
             <a:fld id="{4B3AA8C6-FF6F-4F8F-942E-89BFB6A8B502}" type="datetimeFigureOut">
               <a:rPr lang="en-GB" smtClean="0"/>
-              <a:t>06/10/2018</a:t>
+              <a:t>15/10/2018</a:t>
             </a:fld>
             <a:endParaRPr lang="en-GB"/>
           </a:p>
@@ -872,7 +872,7 @@
           <a:p>
             <a:fld id="{4B3AA8C6-FF6F-4F8F-942E-89BFB6A8B502}" type="datetimeFigureOut">
               <a:rPr lang="en-GB" smtClean="0"/>
-              <a:t>06/10/2018</a:t>
+              <a:t>15/10/2018</a:t>
             </a:fld>
             <a:endParaRPr lang="en-GB"/>
           </a:p>
@@ -1148,7 +1148,7 @@
           <a:p>
             <a:fld id="{4B3AA8C6-FF6F-4F8F-942E-89BFB6A8B502}" type="datetimeFigureOut">
               <a:rPr lang="en-GB" smtClean="0"/>
-              <a:t>06/10/2018</a:t>
+              <a:t>15/10/2018</a:t>
             </a:fld>
             <a:endParaRPr lang="en-GB"/>
           </a:p>
@@ -1416,7 +1416,7 @@
           <a:p>
             <a:fld id="{4B3AA8C6-FF6F-4F8F-942E-89BFB6A8B502}" type="datetimeFigureOut">
               <a:rPr lang="en-GB" smtClean="0"/>
-              <a:t>06/10/2018</a:t>
+              <a:t>15/10/2018</a:t>
             </a:fld>
             <a:endParaRPr lang="en-GB"/>
           </a:p>
@@ -1831,7 +1831,7 @@
           <a:p>
             <a:fld id="{4B3AA8C6-FF6F-4F8F-942E-89BFB6A8B502}" type="datetimeFigureOut">
               <a:rPr lang="en-GB" smtClean="0"/>
-              <a:t>06/10/2018</a:t>
+              <a:t>15/10/2018</a:t>
             </a:fld>
             <a:endParaRPr lang="en-GB"/>
           </a:p>
@@ -1973,7 +1973,7 @@
           <a:p>
             <a:fld id="{4B3AA8C6-FF6F-4F8F-942E-89BFB6A8B502}" type="datetimeFigureOut">
               <a:rPr lang="en-GB" smtClean="0"/>
-              <a:t>06/10/2018</a:t>
+              <a:t>15/10/2018</a:t>
             </a:fld>
             <a:endParaRPr lang="en-GB"/>
           </a:p>
@@ -2086,7 +2086,7 @@
           <a:p>
             <a:fld id="{4B3AA8C6-FF6F-4F8F-942E-89BFB6A8B502}" type="datetimeFigureOut">
               <a:rPr lang="en-GB" smtClean="0"/>
-              <a:t>06/10/2018</a:t>
+              <a:t>15/10/2018</a:t>
             </a:fld>
             <a:endParaRPr lang="en-GB"/>
           </a:p>
@@ -2399,7 +2399,7 @@
           <a:p>
             <a:fld id="{4B3AA8C6-FF6F-4F8F-942E-89BFB6A8B502}" type="datetimeFigureOut">
               <a:rPr lang="en-GB" smtClean="0"/>
-              <a:t>06/10/2018</a:t>
+              <a:t>15/10/2018</a:t>
             </a:fld>
             <a:endParaRPr lang="en-GB"/>
           </a:p>
@@ -2688,7 +2688,7 @@
           <a:p>
             <a:fld id="{4B3AA8C6-FF6F-4F8F-942E-89BFB6A8B502}" type="datetimeFigureOut">
               <a:rPr lang="en-GB" smtClean="0"/>
-              <a:t>06/10/2018</a:t>
+              <a:t>15/10/2018</a:t>
             </a:fld>
             <a:endParaRPr lang="en-GB"/>
           </a:p>
@@ -2931,7 +2931,7 @@
           <a:p>
             <a:fld id="{4B3AA8C6-FF6F-4F8F-942E-89BFB6A8B502}" type="datetimeFigureOut">
               <a:rPr lang="en-GB" smtClean="0"/>
-              <a:t>06/10/2018</a:t>
+              <a:t>15/10/2018</a:t>
             </a:fld>
             <a:endParaRPr lang="en-GB"/>
           </a:p>
@@ -3348,8 +3348,8 @@
           <a:chExt cx="0" cy="0"/>
         </a:xfrm>
       </p:grpSpPr>
-      <mc:AlternateContent xmlns:mc="http://schemas.openxmlformats.org/markup-compatibility/2006" xmlns:am3d="http://schemas.microsoft.com/office/drawing/2017/model3d">
-        <mc:Choice Requires="am3d">
+      <mc:AlternateContent xmlns:mc="http://schemas.openxmlformats.org/markup-compatibility/2006">
+        <mc:Choice xmlns:am3d="http://schemas.microsoft.com/office/drawing/2017/model3d" Requires="am3d">
           <p:graphicFrame>
             <p:nvGraphicFramePr>
               <p:cNvPr id="9" name="Modelo 3D 8" descr="Hemisfério Cinza-Escuro">
@@ -3365,13 +3365,13 @@
               <p:nvPr>
                 <p:extLst>
                   <p:ext uri="{D42A27DB-BD31-4B8C-83A1-F6EECF244321}">
-                    <p14:modId xmlns:p14="http://schemas.microsoft.com/office/powerpoint/2010/main" val="590147565"/>
+                    <p14:modId xmlns:p14="http://schemas.microsoft.com/office/powerpoint/2010/main" val="628257544"/>
                   </p:ext>
                 </p:extLst>
               </p:nvPr>
             </p:nvGraphicFramePr>
             <p:xfrm rot="5400000">
-              <a:off x="9565364" y="1672933"/>
+              <a:off x="9580681" y="1677790"/>
               <a:ext cx="2520000" cy="2050277"/>
             </p:xfrm>
             <a:graphic>
@@ -3439,7 +3439,7 @@
             </a:graphic>
           </p:graphicFrame>
         </mc:Choice>
-        <mc:Fallback xmlns="">
+        <mc:Fallback>
           <p:pic>
             <p:nvPicPr>
               <p:cNvPr id="9" name="Modelo 3D 8" descr="Hemisfério Cinza-Escuro">
@@ -3455,14 +3455,14 @@
               <p:nvPr/>
             </p:nvPicPr>
             <p:blipFill>
-              <a:blip r:embed="rId4"/>
+              <a:blip r:embed="rId3"/>
               <a:stretch>
                 <a:fillRect/>
               </a:stretch>
             </p:blipFill>
             <p:spPr>
               <a:xfrm rot="5400000">
-                <a:off x="9565364" y="1672933"/>
+                <a:off x="9580681" y="1677790"/>
                 <a:ext cx="2520000" cy="2050277"/>
               </a:xfrm>
               <a:prstGeom prst="rect">
@@ -3528,7 +3528,7 @@
                     <am3d:postTrans dx="0" dy="0" dz="0"/>
                   </am3d:trans>
                   <am3d:raster rName="Office3DRenderer" rVer="16.0.8326">
-                    <am3d:blip r:embed="rId4"/>
+                    <am3d:blip r:embed="rId3"/>
                   </am3d:raster>
                   <am3d:objViewport viewportSz="3611788"/>
                   <am3d:ambientLight>
@@ -4231,7 +4231,7 @@
         </p:nvSpPr>
         <p:spPr>
           <a:xfrm>
-            <a:off x="4305926" y="3578018"/>
+            <a:off x="4093535" y="2938809"/>
             <a:ext cx="720069" cy="461665"/>
           </a:xfrm>
           <a:prstGeom prst="rect">
@@ -4266,7 +4266,7 @@
         </p:nvSpPr>
         <p:spPr>
           <a:xfrm>
-            <a:off x="3879864" y="1473783"/>
+            <a:off x="4009648" y="2165668"/>
             <a:ext cx="720069" cy="461665"/>
           </a:xfrm>
           <a:prstGeom prst="rect">
@@ -4284,6 +4284,110 @@
               <a:rPr lang="en-GB" sz="2400" b="1" dirty="0"/>
               <a:t>90%</a:t>
             </a:r>
+          </a:p>
+        </p:txBody>
+      </p:sp>
+      <p:sp>
+        <p:nvSpPr>
+          <p:cNvPr id="26" name="Arco 25">
+            <a:extLst>
+              <a:ext uri="{FF2B5EF4-FFF2-40B4-BE49-F238E27FC236}">
+                <a16:creationId xmlns:a16="http://schemas.microsoft.com/office/drawing/2014/main" id="{9F95BE01-3760-47EA-9481-A8D35F1B6C80}"/>
+              </a:ext>
+            </a:extLst>
+          </p:cNvPr>
+          <p:cNvSpPr/>
+          <p:nvPr/>
+        </p:nvSpPr>
+        <p:spPr>
+          <a:xfrm rot="20774366" flipH="1" flipV="1">
+            <a:off x="3233669" y="3764945"/>
+            <a:ext cx="1852002" cy="579635"/>
+          </a:xfrm>
+          <a:prstGeom prst="arc">
+            <a:avLst>
+              <a:gd name="adj1" fmla="val 10798193"/>
+              <a:gd name="adj2" fmla="val 13819012"/>
+            </a:avLst>
+          </a:prstGeom>
+          <a:ln w="76200">
+            <a:solidFill>
+              <a:schemeClr val="accent4"/>
+            </a:solidFill>
+          </a:ln>
+        </p:spPr>
+        <p:style>
+          <a:lnRef idx="3">
+            <a:schemeClr val="accent5"/>
+          </a:lnRef>
+          <a:fillRef idx="0">
+            <a:schemeClr val="accent5"/>
+          </a:fillRef>
+          <a:effectRef idx="2">
+            <a:schemeClr val="accent5"/>
+          </a:effectRef>
+          <a:fontRef idx="minor">
+            <a:schemeClr val="tx1"/>
+          </a:fontRef>
+        </p:style>
+        <p:txBody>
+          <a:bodyPr rtlCol="0" anchor="ctr"/>
+          <a:lstStyle/>
+          <a:p>
+            <a:pPr algn="ctr"/>
+            <a:endParaRPr lang="en-GB"/>
+          </a:p>
+        </p:txBody>
+      </p:sp>
+      <p:sp>
+        <p:nvSpPr>
+          <p:cNvPr id="27" name="Arco 26">
+            <a:extLst>
+              <a:ext uri="{FF2B5EF4-FFF2-40B4-BE49-F238E27FC236}">
+                <a16:creationId xmlns:a16="http://schemas.microsoft.com/office/drawing/2014/main" id="{62CF3182-78D1-44CA-85C2-E4164A094065}"/>
+              </a:ext>
+            </a:extLst>
+          </p:cNvPr>
+          <p:cNvSpPr/>
+          <p:nvPr/>
+        </p:nvSpPr>
+        <p:spPr>
+          <a:xfrm rot="1588493" flipH="1">
+            <a:off x="6993494" y="4299599"/>
+            <a:ext cx="3614669" cy="1735618"/>
+          </a:xfrm>
+          <a:prstGeom prst="arc">
+            <a:avLst>
+              <a:gd name="adj1" fmla="val 11525221"/>
+              <a:gd name="adj2" fmla="val 19332528"/>
+            </a:avLst>
+          </a:prstGeom>
+          <a:ln w="76200">
+            <a:solidFill>
+              <a:schemeClr val="accent4"/>
+            </a:solidFill>
+          </a:ln>
+        </p:spPr>
+        <p:style>
+          <a:lnRef idx="3">
+            <a:schemeClr val="accent5"/>
+          </a:lnRef>
+          <a:fillRef idx="0">
+            <a:schemeClr val="accent5"/>
+          </a:fillRef>
+          <a:effectRef idx="2">
+            <a:schemeClr val="accent5"/>
+          </a:effectRef>
+          <a:fontRef idx="minor">
+            <a:schemeClr val="tx1"/>
+          </a:fontRef>
+        </p:style>
+        <p:txBody>
+          <a:bodyPr rtlCol="0" anchor="ctr"/>
+          <a:lstStyle/>
+          <a:p>
+            <a:pPr algn="ctr"/>
+            <a:endParaRPr lang="en-GB"/>
           </a:p>
         </p:txBody>
       </p:sp>

</xml_diff>